<commit_message>
BUG: Update PPTXHandler docs
</commit_message>
<xml_diff>
--- a/pptxhandler/table/template.pptx
+++ b/pptxhandler/table/template.pptx
@@ -200,7 +200,7 @@
           <a:p>
             <a:fld id="{A3FB9C2A-7470-3441-BF28-E4636B74A154}" type="datetimeFigureOut">
               <a:rPr lang="en-US" smtClean="0"/>
-              <a:t>7/8/2020</a:t>
+              <a:t>7/11/2020</a:t>
             </a:fld>
             <a:endParaRPr lang="en-US"/>
           </a:p>
@@ -1423,7 +1423,7 @@
             </a:r>
             <a:r>
               <a:rPr lang="en-US" dirty="0"/>
-              <a:t> lets you set text properties.</a:t>
+              <a:t> lets you set table properties.</a:t>
             </a:r>
           </a:p>
           <a:p>
@@ -1481,14 +1481,14 @@
           <p:nvPr>
             <p:extLst>
               <p:ext uri="{D42A27DB-BD31-4B8C-83A1-F6EECF244321}">
-                <p14:modId xmlns:p14="http://schemas.microsoft.com/office/powerpoint/2010/main" val="1953279057"/>
+                <p14:modId xmlns:p14="http://schemas.microsoft.com/office/powerpoint/2010/main" val="1940675522"/>
               </p:ext>
             </p:extLst>
           </p:nvPr>
         </p:nvGraphicFramePr>
         <p:xfrm>
-          <a:off x="4572000" y="1155656"/>
-          <a:ext cx="3657600" cy="1554480"/>
+          <a:off x="4572000" y="1366520"/>
+          <a:ext cx="3657600" cy="1371600"/>
         </p:xfrm>
         <a:graphic>
           <a:graphicData uri="http://schemas.openxmlformats.org/drawingml/2006/table">
@@ -1512,17 +1512,17 @@
                   </a:extLst>
                 </a:gridCol>
               </a:tblGrid>
-              <a:tr h="370840">
+              <a:tr h="307296">
                 <a:tc>
                   <a:txBody>
                     <a:bodyPr/>
                     <a:lstStyle/>
                     <a:p>
                       <a:r>
-                        <a:rPr lang="en-IN" sz="2800" dirty="0" err="1"/>
-                        <a:t>Dfdf</a:t>
+                        <a:rPr lang="en-IN" sz="2400" dirty="0"/>
+                        <a:t>Text</a:t>
                       </a:r>
-                      <a:endParaRPr lang="en-US" sz="2800" dirty="0"/>
+                      <a:endParaRPr lang="en-US" sz="2400" dirty="0"/>
                     </a:p>
                   </a:txBody>
                   <a:tcPr/>
@@ -1534,10 +1534,10 @@
                     <a:p>
                       <a:pPr algn="r"/>
                       <a:r>
-                        <a:rPr lang="en-IN" sz="2800" dirty="0"/>
-                        <a:t>text</a:t>
+                        <a:rPr lang="en-IN" sz="2400" dirty="0"/>
+                        <a:t>Text</a:t>
                       </a:r>
-                      <a:endParaRPr lang="en-US" sz="2800" dirty="0"/>
+                      <a:endParaRPr lang="en-US" sz="2400" dirty="0"/>
                     </a:p>
                   </a:txBody>
                   <a:tcPr/>
@@ -1555,10 +1555,10 @@
                     <a:lstStyle/>
                     <a:p>
                       <a:r>
-                        <a:rPr lang="en-IN" sz="2800" dirty="0" err="1"/>
-                        <a:t>Dfd</a:t>
+                        <a:rPr lang="en-IN" sz="2400" dirty="0"/>
+                        <a:t>Text</a:t>
                       </a:r>
-                      <a:endParaRPr lang="en-US" sz="2800" dirty="0"/>
+                      <a:endParaRPr lang="en-US" sz="2400" dirty="0"/>
                     </a:p>
                   </a:txBody>
                   <a:tcPr/>
@@ -1570,10 +1570,10 @@
                     <a:p>
                       <a:pPr algn="r"/>
                       <a:r>
-                        <a:rPr lang="en-IN" sz="2800" dirty="0" err="1"/>
-                        <a:t>Efdf</a:t>
+                        <a:rPr lang="en-IN" sz="2400" dirty="0"/>
+                        <a:t>Text</a:t>
                       </a:r>
-                      <a:endParaRPr lang="en-US" sz="2800" dirty="0"/>
+                      <a:endParaRPr lang="en-US" sz="2400" dirty="0"/>
                     </a:p>
                   </a:txBody>
                   <a:tcPr/>
@@ -1591,10 +1591,10 @@
                     <a:lstStyle/>
                     <a:p>
                       <a:r>
-                        <a:rPr lang="en-IN" sz="2800" dirty="0" err="1"/>
-                        <a:t>Dfdf</a:t>
+                        <a:rPr lang="en-IN" sz="2400" dirty="0"/>
+                        <a:t>Text</a:t>
                       </a:r>
-                      <a:endParaRPr lang="en-US" sz="2800" dirty="0"/>
+                      <a:endParaRPr lang="en-US" sz="2400" dirty="0"/>
                     </a:p>
                   </a:txBody>
                   <a:tcPr/>
@@ -1606,10 +1606,10 @@
                     <a:p>
                       <a:pPr algn="r"/>
                       <a:r>
-                        <a:rPr lang="en-IN" sz="2800"/>
-                        <a:t>dfdf</a:t>
+                        <a:rPr lang="en-IN" sz="2400" dirty="0"/>
+                        <a:t>Text</a:t>
                       </a:r>
-                      <a:endParaRPr lang="en-US" sz="2800" dirty="0"/>
+                      <a:endParaRPr lang="en-US" sz="2400" dirty="0"/>
                     </a:p>
                   </a:txBody>
                   <a:tcPr/>

</xml_diff>